<commit_message>
Updating Synapse administration deck
</commit_message>
<xml_diff>
--- a/Slides/03 - Synapse Administration.pptx
+++ b/Slides/03 - Synapse Administration.pptx
@@ -27,20 +27,26 @@
     <p:sldId id="259" r:id="rId21"/>
     <p:sldId id="277" r:id="rId22"/>
     <p:sldId id="278" r:id="rId23"/>
-    <p:sldId id="279" r:id="rId24"/>
-    <p:sldId id="290" r:id="rId25"/>
-    <p:sldId id="291" r:id="rId26"/>
-    <p:sldId id="289" r:id="rId27"/>
-    <p:sldId id="280" r:id="rId28"/>
+    <p:sldId id="297" r:id="rId24"/>
+    <p:sldId id="279" r:id="rId25"/>
+    <p:sldId id="289" r:id="rId26"/>
+    <p:sldId id="280" r:id="rId27"/>
+    <p:sldId id="293" r:id="rId28"/>
     <p:sldId id="281" r:id="rId29"/>
-    <p:sldId id="260" r:id="rId30"/>
-    <p:sldId id="282" r:id="rId31"/>
-    <p:sldId id="283" r:id="rId32"/>
-    <p:sldId id="284" r:id="rId33"/>
-    <p:sldId id="288" r:id="rId34"/>
-    <p:sldId id="285" r:id="rId35"/>
-    <p:sldId id="286" r:id="rId36"/>
-    <p:sldId id="287" r:id="rId37"/>
+    <p:sldId id="294" r:id="rId30"/>
+    <p:sldId id="298" r:id="rId31"/>
+    <p:sldId id="296" r:id="rId32"/>
+    <p:sldId id="299" r:id="rId33"/>
+    <p:sldId id="295" r:id="rId34"/>
+    <p:sldId id="260" r:id="rId35"/>
+    <p:sldId id="282" r:id="rId36"/>
+    <p:sldId id="283" r:id="rId37"/>
+    <p:sldId id="284" r:id="rId38"/>
+    <p:sldId id="288" r:id="rId39"/>
+    <p:sldId id="285" r:id="rId40"/>
+    <p:sldId id="286" r:id="rId41"/>
+    <p:sldId id="287" r:id="rId42"/>
+    <p:sldId id="292" r:id="rId43"/>
   </p:sldIdLst>
   <p:sldSz cx="12192000" cy="6858000"/>
   <p:notesSz cx="6858000" cy="9144000"/>
@@ -5488,26 +5494,49 @@
           <a:p>
             <a:r>
               <a:rPr lang="en-US" dirty="0"/>
-              <a:t>Dedicated SQL Pool Logging</a:t>
-            </a:r>
+              <a:t>Workspace Logging</a:t>
+            </a:r>
+          </a:p>
+        </p:txBody>
+      </p:sp>
+      <p:sp>
+        <p:nvSpPr>
+          <p:cNvPr id="7" name="Content Placeholder 6">
+            <a:extLst>
+              <a:ext uri="{FF2B5EF4-FFF2-40B4-BE49-F238E27FC236}">
+                <a16:creationId xmlns:a16="http://schemas.microsoft.com/office/drawing/2014/main" id="{5276842E-2EFF-99A4-5AB2-AF9472C0CEC8}"/>
+              </a:ext>
+            </a:extLst>
+          </p:cNvPr>
+          <p:cNvSpPr>
+            <a:spLocks noGrp="1"/>
+          </p:cNvSpPr>
+          <p:nvPr>
+            <p:ph idx="1"/>
+          </p:nvPr>
+        </p:nvSpPr>
+        <p:spPr/>
+        <p:txBody>
+          <a:bodyPr/>
+          <a:lstStyle/>
+          <a:p>
+            <a:endParaRPr lang="en-US"/>
           </a:p>
         </p:txBody>
       </p:sp>
       <p:pic>
         <p:nvPicPr>
-          <p:cNvPr id="3" name="Content Placeholder 2">
-            <a:extLst>
-              <a:ext uri="{FF2B5EF4-FFF2-40B4-BE49-F238E27FC236}">
-                <a16:creationId xmlns:a16="http://schemas.microsoft.com/office/drawing/2014/main" id="{DDB35D70-E23D-BFA4-B5AA-01F4BF8A8B44}"/>
+          <p:cNvPr id="9" name="Picture 8">
+            <a:extLst>
+              <a:ext uri="{FF2B5EF4-FFF2-40B4-BE49-F238E27FC236}">
+                <a16:creationId xmlns:a16="http://schemas.microsoft.com/office/drawing/2014/main" id="{21D13523-FEF6-07F4-079C-DCF805BA301B}"/>
               </a:ext>
             </a:extLst>
           </p:cNvPr>
           <p:cNvPicPr>
-            <a:picLocks noGrp="1" noChangeAspect="1"/>
+            <a:picLocks noChangeAspect="1"/>
           </p:cNvPicPr>
-          <p:nvPr>
-            <p:ph idx="1"/>
-          </p:nvPr>
+          <p:nvPr/>
         </p:nvPicPr>
         <p:blipFill>
           <a:blip r:embed="rId2"/>
@@ -5517,9 +5546,12 @@
         </p:blipFill>
         <p:spPr>
           <a:xfrm>
-            <a:off x="1164771" y="1455810"/>
-            <a:ext cx="9862457" cy="5402190"/>
+            <a:off x="1377941" y="1401076"/>
+            <a:ext cx="9436117" cy="5456924"/>
           </a:xfrm>
+          <a:prstGeom prst="rect">
+            <a:avLst/>
+          </a:prstGeom>
         </p:spPr>
       </p:pic>
     </p:spTree>
@@ -5575,6 +5607,93 @@
           <a:p>
             <a:r>
               <a:rPr lang="en-US" dirty="0"/>
+              <a:t>Dedicated SQL Pool Logging</a:t>
+            </a:r>
+          </a:p>
+        </p:txBody>
+      </p:sp>
+      <p:pic>
+        <p:nvPicPr>
+          <p:cNvPr id="3" name="Content Placeholder 2">
+            <a:extLst>
+              <a:ext uri="{FF2B5EF4-FFF2-40B4-BE49-F238E27FC236}">
+                <a16:creationId xmlns:a16="http://schemas.microsoft.com/office/drawing/2014/main" id="{DDB35D70-E23D-BFA4-B5AA-01F4BF8A8B44}"/>
+              </a:ext>
+            </a:extLst>
+          </p:cNvPr>
+          <p:cNvPicPr>
+            <a:picLocks noGrp="1" noChangeAspect="1"/>
+          </p:cNvPicPr>
+          <p:nvPr>
+            <p:ph idx="1"/>
+          </p:nvPr>
+        </p:nvPicPr>
+        <p:blipFill>
+          <a:blip r:embed="rId2"/>
+          <a:stretch>
+            <a:fillRect/>
+          </a:stretch>
+        </p:blipFill>
+        <p:spPr>
+          <a:xfrm>
+            <a:off x="1164771" y="1455810"/>
+            <a:ext cx="9862457" cy="5402190"/>
+          </a:xfrm>
+        </p:spPr>
+      </p:pic>
+    </p:spTree>
+    <p:extLst>
+      <p:ext uri="{BB962C8B-B14F-4D97-AF65-F5344CB8AC3E}">
+        <p14:creationId xmlns:p14="http://schemas.microsoft.com/office/powerpoint/2010/main" val="2175819647"/>
+      </p:ext>
+    </p:extLst>
+  </p:cSld>
+  <p:clrMapOvr>
+    <a:masterClrMapping/>
+  </p:clrMapOvr>
+</p:sld>
+</file>
+
+<file path=ppt/slides/slide24.xml><?xml version="1.0" encoding="utf-8"?>
+<p:sld xmlns:a="http://schemas.openxmlformats.org/drawingml/2006/main" xmlns:r="http://schemas.openxmlformats.org/officeDocument/2006/relationships" xmlns:p="http://schemas.openxmlformats.org/presentationml/2006/main">
+  <p:cSld>
+    <p:spTree>
+      <p:nvGrpSpPr>
+        <p:cNvPr id="1" name=""/>
+        <p:cNvGrpSpPr/>
+        <p:nvPr/>
+      </p:nvGrpSpPr>
+      <p:grpSpPr>
+        <a:xfrm>
+          <a:off x="0" y="0"/>
+          <a:ext cx="0" cy="0"/>
+          <a:chOff x="0" y="0"/>
+          <a:chExt cx="0" cy="0"/>
+        </a:xfrm>
+      </p:grpSpPr>
+      <p:sp>
+        <p:nvSpPr>
+          <p:cNvPr id="4" name="Title 3">
+            <a:extLst>
+              <a:ext uri="{FF2B5EF4-FFF2-40B4-BE49-F238E27FC236}">
+                <a16:creationId xmlns:a16="http://schemas.microsoft.com/office/drawing/2014/main" id="{1DE06A61-1415-1FA6-6839-387C48430486}"/>
+              </a:ext>
+            </a:extLst>
+          </p:cNvPr>
+          <p:cNvSpPr>
+            <a:spLocks noGrp="1"/>
+          </p:cNvSpPr>
+          <p:nvPr>
+            <p:ph type="title"/>
+          </p:nvPr>
+        </p:nvSpPr>
+        <p:spPr/>
+        <p:txBody>
+          <a:bodyPr/>
+          <a:lstStyle/>
+          <a:p>
+            <a:r>
+              <a:rPr lang="en-US" dirty="0"/>
               <a:t>Spark Pool Logging</a:t>
             </a:r>
           </a:p>
@@ -5622,241 +5741,7 @@
 </p:sld>
 </file>
 
-<file path=ppt/slides/slide24.xml><?xml version="1.0" encoding="utf-8"?>
-<p:sld xmlns:a="http://schemas.openxmlformats.org/drawingml/2006/main" xmlns:r="http://schemas.openxmlformats.org/officeDocument/2006/relationships" xmlns:p="http://schemas.openxmlformats.org/presentationml/2006/main">
-  <p:cSld>
-    <p:spTree>
-      <p:nvGrpSpPr>
-        <p:cNvPr id="1" name=""/>
-        <p:cNvGrpSpPr/>
-        <p:nvPr/>
-      </p:nvGrpSpPr>
-      <p:grpSpPr>
-        <a:xfrm>
-          <a:off x="0" y="0"/>
-          <a:ext cx="0" cy="0"/>
-          <a:chOff x="0" y="0"/>
-          <a:chExt cx="0" cy="0"/>
-        </a:xfrm>
-      </p:grpSpPr>
-      <p:sp>
-        <p:nvSpPr>
-          <p:cNvPr id="2" name="Title 1">
-            <a:extLst>
-              <a:ext uri="{FF2B5EF4-FFF2-40B4-BE49-F238E27FC236}">
-                <a16:creationId xmlns:a16="http://schemas.microsoft.com/office/drawing/2014/main" id="{605BE413-45E5-067B-22AB-BB2FE1A70FFB}"/>
-              </a:ext>
-            </a:extLst>
-          </p:cNvPr>
-          <p:cNvSpPr>
-            <a:spLocks noGrp="1"/>
-          </p:cNvSpPr>
-          <p:nvPr>
-            <p:ph type="title"/>
-          </p:nvPr>
-        </p:nvSpPr>
-        <p:spPr/>
-        <p:txBody>
-          <a:bodyPr/>
-          <a:lstStyle/>
-          <a:p>
-            <a:r>
-              <a:rPr lang="en-US" dirty="0"/>
-              <a:t>Spark Pool Metrics to Blob Storage</a:t>
-            </a:r>
-          </a:p>
-        </p:txBody>
-      </p:sp>
-      <p:sp>
-        <p:nvSpPr>
-          <p:cNvPr id="3" name="Content Placeholder 2">
-            <a:extLst>
-              <a:ext uri="{FF2B5EF4-FFF2-40B4-BE49-F238E27FC236}">
-                <a16:creationId xmlns:a16="http://schemas.microsoft.com/office/drawing/2014/main" id="{65D28381-0135-5E72-F5E3-87BE2BFB1E20}"/>
-              </a:ext>
-            </a:extLst>
-          </p:cNvPr>
-          <p:cNvSpPr>
-            <a:spLocks noGrp="1"/>
-          </p:cNvSpPr>
-          <p:nvPr>
-            <p:ph idx="1"/>
-          </p:nvPr>
-        </p:nvSpPr>
-        <p:spPr/>
-        <p:txBody>
-          <a:bodyPr/>
-          <a:lstStyle/>
-          <a:p>
-            <a:pPr marL="0" indent="0">
-              <a:buNone/>
-            </a:pPr>
-            <a:r>
-              <a:rPr lang="en-US" dirty="0"/>
-              <a:t>Step 1:  Open Apache Spark configuration</a:t>
-            </a:r>
-          </a:p>
-        </p:txBody>
-      </p:sp>
-      <p:pic>
-        <p:nvPicPr>
-          <p:cNvPr id="7" name="Picture 6">
-            <a:extLst>
-              <a:ext uri="{FF2B5EF4-FFF2-40B4-BE49-F238E27FC236}">
-                <a16:creationId xmlns:a16="http://schemas.microsoft.com/office/drawing/2014/main" id="{7395A087-7FFE-C2A0-B315-C8AEA46E71C4}"/>
-              </a:ext>
-            </a:extLst>
-          </p:cNvPr>
-          <p:cNvPicPr>
-            <a:picLocks noChangeAspect="1"/>
-          </p:cNvPicPr>
-          <p:nvPr/>
-        </p:nvPicPr>
-        <p:blipFill>
-          <a:blip r:embed="rId2"/>
-          <a:stretch>
-            <a:fillRect/>
-          </a:stretch>
-        </p:blipFill>
-        <p:spPr>
-          <a:xfrm>
-            <a:off x="1822941" y="2522023"/>
-            <a:ext cx="8546117" cy="3970852"/>
-          </a:xfrm>
-          <a:prstGeom prst="rect">
-            <a:avLst/>
-          </a:prstGeom>
-        </p:spPr>
-      </p:pic>
-    </p:spTree>
-    <p:extLst>
-      <p:ext uri="{BB962C8B-B14F-4D97-AF65-F5344CB8AC3E}">
-        <p14:creationId xmlns:p14="http://schemas.microsoft.com/office/powerpoint/2010/main" val="2856047118"/>
-      </p:ext>
-    </p:extLst>
-  </p:cSld>
-  <p:clrMapOvr>
-    <a:masterClrMapping/>
-  </p:clrMapOvr>
-</p:sld>
-</file>
-
 <file path=ppt/slides/slide25.xml><?xml version="1.0" encoding="utf-8"?>
-<p:sld xmlns:a="http://schemas.openxmlformats.org/drawingml/2006/main" xmlns:r="http://schemas.openxmlformats.org/officeDocument/2006/relationships" xmlns:p="http://schemas.openxmlformats.org/presentationml/2006/main">
-  <p:cSld>
-    <p:spTree>
-      <p:nvGrpSpPr>
-        <p:cNvPr id="1" name=""/>
-        <p:cNvGrpSpPr/>
-        <p:nvPr/>
-      </p:nvGrpSpPr>
-      <p:grpSpPr>
-        <a:xfrm>
-          <a:off x="0" y="0"/>
-          <a:ext cx="0" cy="0"/>
-          <a:chOff x="0" y="0"/>
-          <a:chExt cx="0" cy="0"/>
-        </a:xfrm>
-      </p:grpSpPr>
-      <p:sp>
-        <p:nvSpPr>
-          <p:cNvPr id="2" name="Title 1">
-            <a:extLst>
-              <a:ext uri="{FF2B5EF4-FFF2-40B4-BE49-F238E27FC236}">
-                <a16:creationId xmlns:a16="http://schemas.microsoft.com/office/drawing/2014/main" id="{3E4264E7-0B60-AD89-B43A-35357E2C3CEE}"/>
-              </a:ext>
-            </a:extLst>
-          </p:cNvPr>
-          <p:cNvSpPr>
-            <a:spLocks noGrp="1"/>
-          </p:cNvSpPr>
-          <p:nvPr>
-            <p:ph type="title"/>
-          </p:nvPr>
-        </p:nvSpPr>
-        <p:spPr/>
-        <p:txBody>
-          <a:bodyPr/>
-          <a:lstStyle/>
-          <a:p>
-            <a:r>
-              <a:rPr lang="en-US" dirty="0"/>
-              <a:t>Spark Pool Metrics to Blob Storage</a:t>
-            </a:r>
-          </a:p>
-        </p:txBody>
-      </p:sp>
-      <p:pic>
-        <p:nvPicPr>
-          <p:cNvPr id="7" name="Content Placeholder 6">
-            <a:extLst>
-              <a:ext uri="{FF2B5EF4-FFF2-40B4-BE49-F238E27FC236}">
-                <a16:creationId xmlns:a16="http://schemas.microsoft.com/office/drawing/2014/main" id="{15050629-78A7-E926-CFAB-F6A0DEFC8AE7}"/>
-              </a:ext>
-            </a:extLst>
-          </p:cNvPr>
-          <p:cNvPicPr>
-            <a:picLocks noGrp="1" noChangeAspect="1"/>
-          </p:cNvPicPr>
-          <p:nvPr>
-            <p:ph sz="half" idx="1"/>
-          </p:nvPr>
-        </p:nvPicPr>
-        <p:blipFill>
-          <a:blip r:embed="rId2"/>
-          <a:stretch>
-            <a:fillRect/>
-          </a:stretch>
-        </p:blipFill>
-        <p:spPr>
-          <a:xfrm>
-            <a:off x="838200" y="2677591"/>
-            <a:ext cx="5181600" cy="2647405"/>
-          </a:xfrm>
-        </p:spPr>
-      </p:pic>
-      <p:sp>
-        <p:nvSpPr>
-          <p:cNvPr id="5" name="Content Placeholder 4">
-            <a:extLst>
-              <a:ext uri="{FF2B5EF4-FFF2-40B4-BE49-F238E27FC236}">
-                <a16:creationId xmlns:a16="http://schemas.microsoft.com/office/drawing/2014/main" id="{6EBC5DE7-B760-F093-B66D-CF5AD8C5E1C8}"/>
-              </a:ext>
-            </a:extLst>
-          </p:cNvPr>
-          <p:cNvSpPr>
-            <a:spLocks noGrp="1"/>
-          </p:cNvSpPr>
-          <p:nvPr>
-            <p:ph sz="half" idx="2"/>
-          </p:nvPr>
-        </p:nvSpPr>
-        <p:spPr/>
-        <p:txBody>
-          <a:bodyPr/>
-          <a:lstStyle/>
-          <a:p>
-            <a:r>
-              <a:rPr lang="en-US" dirty="0"/>
-              <a:t>TODO:  old instructions?</a:t>
-            </a:r>
-          </a:p>
-        </p:txBody>
-      </p:sp>
-    </p:spTree>
-    <p:extLst>
-      <p:ext uri="{BB962C8B-B14F-4D97-AF65-F5344CB8AC3E}">
-        <p14:creationId xmlns:p14="http://schemas.microsoft.com/office/powerpoint/2010/main" val="2755508970"/>
-      </p:ext>
-    </p:extLst>
-  </p:cSld>
-  <p:clrMapOvr>
-    <a:masterClrMapping/>
-  </p:clrMapOvr>
-</p:sld>
-</file>
-
-<file path=ppt/slides/slide26.xml><?xml version="1.0" encoding="utf-8"?>
 <p:sld xmlns:a="http://schemas.openxmlformats.org/drawingml/2006/main" xmlns:r="http://schemas.openxmlformats.org/officeDocument/2006/relationships" xmlns:p="http://schemas.openxmlformats.org/presentationml/2006/main">
   <p:cSld>
     <p:spTree>
@@ -5943,7 +5828,7 @@
 </p:sld>
 </file>
 
-<file path=ppt/slides/slide27.xml><?xml version="1.0" encoding="utf-8"?>
+<file path=ppt/slides/slide26.xml><?xml version="1.0" encoding="utf-8"?>
 <p:sld xmlns:a="http://schemas.openxmlformats.org/drawingml/2006/main" xmlns:r="http://schemas.openxmlformats.org/officeDocument/2006/relationships" xmlns:p="http://schemas.openxmlformats.org/presentationml/2006/main">
   <p:cSld>
     <p:spTree>
@@ -6030,6 +5915,154 @@
 </p:sld>
 </file>
 
+<file path=ppt/slides/slide27.xml><?xml version="1.0" encoding="utf-8"?>
+<p:sld xmlns:a="http://schemas.openxmlformats.org/drawingml/2006/main" xmlns:r="http://schemas.openxmlformats.org/officeDocument/2006/relationships" xmlns:p="http://schemas.openxmlformats.org/presentationml/2006/main">
+  <p:cSld>
+    <p:spTree>
+      <p:nvGrpSpPr>
+        <p:cNvPr id="1" name=""/>
+        <p:cNvGrpSpPr/>
+        <p:nvPr/>
+      </p:nvGrpSpPr>
+      <p:grpSpPr>
+        <a:xfrm>
+          <a:off x="0" y="0"/>
+          <a:ext cx="0" cy="0"/>
+          <a:chOff x="0" y="0"/>
+          <a:chExt cx="0" cy="0"/>
+        </a:xfrm>
+      </p:grpSpPr>
+      <p:sp>
+        <p:nvSpPr>
+          <p:cNvPr id="2" name="Title 1">
+            <a:extLst>
+              <a:ext uri="{FF2B5EF4-FFF2-40B4-BE49-F238E27FC236}">
+                <a16:creationId xmlns:a16="http://schemas.microsoft.com/office/drawing/2014/main" id="{358C3377-7078-F23A-98D2-97EEF9132EC8}"/>
+              </a:ext>
+            </a:extLst>
+          </p:cNvPr>
+          <p:cNvSpPr>
+            <a:spLocks noGrp="1"/>
+          </p:cNvSpPr>
+          <p:nvPr>
+            <p:ph type="title"/>
+          </p:nvPr>
+        </p:nvSpPr>
+        <p:spPr/>
+        <p:txBody>
+          <a:bodyPr/>
+          <a:lstStyle/>
+          <a:p>
+            <a:r>
+              <a:rPr lang="en-US" dirty="0"/>
+              <a:t>Querying Data in Log Analytics</a:t>
+            </a:r>
+          </a:p>
+        </p:txBody>
+      </p:sp>
+      <p:sp>
+        <p:nvSpPr>
+          <p:cNvPr id="4" name="Content Placeholder 3">
+            <a:extLst>
+              <a:ext uri="{FF2B5EF4-FFF2-40B4-BE49-F238E27FC236}">
+                <a16:creationId xmlns:a16="http://schemas.microsoft.com/office/drawing/2014/main" id="{EF788FA6-6E23-5898-4FCA-F671F41C7BD4}"/>
+              </a:ext>
+            </a:extLst>
+          </p:cNvPr>
+          <p:cNvSpPr>
+            <a:spLocks noGrp="1"/>
+          </p:cNvSpPr>
+          <p:nvPr>
+            <p:ph sz="half" idx="1"/>
+          </p:nvPr>
+        </p:nvSpPr>
+        <p:spPr/>
+        <p:txBody>
+          <a:bodyPr/>
+          <a:lstStyle/>
+          <a:p>
+            <a:r>
+              <a:rPr lang="en-US" dirty="0"/>
+              <a:t>Queries available in the </a:t>
+            </a:r>
+            <a:r>
+              <a:rPr lang="en-US" dirty="0">
+                <a:hlinkClick r:id="rId2"/>
+              </a:rPr>
+              <a:t>Azure Synapse Toolbox</a:t>
+            </a:r>
+            <a:endParaRPr lang="en-US" dirty="0"/>
+          </a:p>
+          <a:p>
+            <a:r>
+              <a:rPr lang="en-US" dirty="0"/>
+              <a:t>Requires data in Log Analytics</a:t>
+            </a:r>
+          </a:p>
+          <a:p>
+            <a:r>
+              <a:rPr lang="en-US" dirty="0"/>
+              <a:t>Pre-created KQL queries to analyze SQL pools, Spark pools, and Synapse Pipelines</a:t>
+            </a:r>
+          </a:p>
+          <a:p>
+            <a:r>
+              <a:rPr lang="en-US" dirty="0"/>
+              <a:t>Several places to submit queries:  Log Analytics in portal, Logs in Synapse workspace, </a:t>
+            </a:r>
+            <a:r>
+              <a:rPr lang="en-US" dirty="0" err="1"/>
+              <a:t>az</a:t>
+            </a:r>
+            <a:r>
+              <a:rPr lang="en-US" dirty="0"/>
+              <a:t> CLI, etc.</a:t>
+            </a:r>
+          </a:p>
+        </p:txBody>
+      </p:sp>
+      <p:pic>
+        <p:nvPicPr>
+          <p:cNvPr id="7" name="Content Placeholder 6">
+            <a:extLst>
+              <a:ext uri="{FF2B5EF4-FFF2-40B4-BE49-F238E27FC236}">
+                <a16:creationId xmlns:a16="http://schemas.microsoft.com/office/drawing/2014/main" id="{4AA66EB6-1B56-39BD-8441-02156D4441CA}"/>
+              </a:ext>
+            </a:extLst>
+          </p:cNvPr>
+          <p:cNvPicPr>
+            <a:picLocks noGrp="1" noChangeAspect="1"/>
+          </p:cNvPicPr>
+          <p:nvPr>
+            <p:ph sz="half" idx="2"/>
+          </p:nvPr>
+        </p:nvPicPr>
+        <p:blipFill>
+          <a:blip r:embed="rId3"/>
+          <a:stretch>
+            <a:fillRect/>
+          </a:stretch>
+        </p:blipFill>
+        <p:spPr>
+          <a:xfrm>
+            <a:off x="7105857" y="2144151"/>
+            <a:ext cx="3314286" cy="3714286"/>
+          </a:xfrm>
+        </p:spPr>
+      </p:pic>
+    </p:spTree>
+    <p:extLst>
+      <p:ext uri="{BB962C8B-B14F-4D97-AF65-F5344CB8AC3E}">
+        <p14:creationId xmlns:p14="http://schemas.microsoft.com/office/powerpoint/2010/main" val="3389135334"/>
+      </p:ext>
+    </p:extLst>
+  </p:cSld>
+  <p:clrMapOvr>
+    <a:masterClrMapping/>
+  </p:clrMapOvr>
+</p:sld>
+</file>
+
 <file path=ppt/slides/slide28.xml><?xml version="1.0" encoding="utf-8"?>
 <p:sld xmlns:a="http://schemas.openxmlformats.org/drawingml/2006/main" xmlns:r="http://schemas.openxmlformats.org/officeDocument/2006/relationships" xmlns:p="http://schemas.openxmlformats.org/presentationml/2006/main">
   <p:cSld>
@@ -6070,36 +6103,40 @@
           <a:p>
             <a:r>
               <a:rPr lang="en-US" dirty="0"/>
-              <a:t>TODO - ??</a:t>
-            </a:r>
-          </a:p>
-        </p:txBody>
-      </p:sp>
-      <p:sp>
-        <p:nvSpPr>
-          <p:cNvPr id="5" name="Content Placeholder 4">
-            <a:extLst>
-              <a:ext uri="{FF2B5EF4-FFF2-40B4-BE49-F238E27FC236}">
-                <a16:creationId xmlns:a16="http://schemas.microsoft.com/office/drawing/2014/main" id="{532BC219-B615-310E-B0E6-5E5A298F3870}"/>
-              </a:ext>
-            </a:extLst>
-          </p:cNvPr>
-          <p:cNvSpPr>
-            <a:spLocks noGrp="1"/>
-          </p:cNvSpPr>
+              <a:t>Running a Log Analytics Query</a:t>
+            </a:r>
+          </a:p>
+        </p:txBody>
+      </p:sp>
+      <p:pic>
+        <p:nvPicPr>
+          <p:cNvPr id="7" name="Content Placeholder 6">
+            <a:extLst>
+              <a:ext uri="{FF2B5EF4-FFF2-40B4-BE49-F238E27FC236}">
+                <a16:creationId xmlns:a16="http://schemas.microsoft.com/office/drawing/2014/main" id="{7C9CBA32-9895-40AE-9353-D07EBB197D9C}"/>
+              </a:ext>
+            </a:extLst>
+          </p:cNvPr>
+          <p:cNvPicPr>
+            <a:picLocks noGrp="1" noChangeAspect="1"/>
+          </p:cNvPicPr>
           <p:nvPr>
             <p:ph idx="1"/>
           </p:nvPr>
-        </p:nvSpPr>
-        <p:spPr/>
-        <p:txBody>
-          <a:bodyPr/>
-          <a:lstStyle/>
-          <a:p>
-            <a:endParaRPr lang="en-US"/>
-          </a:p>
-        </p:txBody>
-      </p:sp>
+        </p:nvPicPr>
+        <p:blipFill>
+          <a:blip r:embed="rId2"/>
+          <a:stretch>
+            <a:fillRect/>
+          </a:stretch>
+        </p:blipFill>
+        <p:spPr>
+          <a:xfrm>
+            <a:off x="445447" y="1446255"/>
+            <a:ext cx="11301106" cy="5327770"/>
+          </a:xfrm>
+        </p:spPr>
+      </p:pic>
     </p:spTree>
     <p:extLst>
       <p:ext uri="{BB962C8B-B14F-4D97-AF65-F5344CB8AC3E}">
@@ -6135,7 +6172,7 @@
           <p:cNvPr id="4" name="Title 3">
             <a:extLst>
               <a:ext uri="{FF2B5EF4-FFF2-40B4-BE49-F238E27FC236}">
-                <a16:creationId xmlns:a16="http://schemas.microsoft.com/office/drawing/2014/main" id="{F212848B-D1EF-74B2-9ED1-1EC88AEFA32B}"/>
+                <a16:creationId xmlns:a16="http://schemas.microsoft.com/office/drawing/2014/main" id="{1DE06A61-1415-1FA6-6839-387C48430486}"/>
               </a:ext>
             </a:extLst>
           </p:cNvPr>
@@ -6153,40 +6190,102 @@
           <a:p>
             <a:r>
               <a:rPr lang="en-US" dirty="0"/>
-              <a:t>Monitoring</a:t>
-            </a:r>
-          </a:p>
-        </p:txBody>
-      </p:sp>
-      <p:sp>
-        <p:nvSpPr>
-          <p:cNvPr id="5" name="Text Placeholder 4">
-            <a:extLst>
-              <a:ext uri="{FF2B5EF4-FFF2-40B4-BE49-F238E27FC236}">
-                <a16:creationId xmlns:a16="http://schemas.microsoft.com/office/drawing/2014/main" id="{E2A70AB1-F0D0-47F9-C4D9-39A37A431FEF}"/>
-              </a:ext>
-            </a:extLst>
-          </p:cNvPr>
-          <p:cNvSpPr>
-            <a:spLocks noGrp="1"/>
-          </p:cNvSpPr>
-          <p:nvPr>
-            <p:ph type="body" idx="1"/>
-          </p:nvPr>
-        </p:nvSpPr>
-        <p:spPr/>
-        <p:txBody>
-          <a:bodyPr/>
-          <a:lstStyle/>
-          <a:p>
-            <a:endParaRPr lang="en-US"/>
-          </a:p>
-        </p:txBody>
-      </p:sp>
+              <a:t>Running a Log Analytics Query</a:t>
+            </a:r>
+          </a:p>
+        </p:txBody>
+      </p:sp>
+      <p:sp>
+        <p:nvSpPr>
+          <p:cNvPr id="2" name="Content Placeholder 1">
+            <a:extLst>
+              <a:ext uri="{FF2B5EF4-FFF2-40B4-BE49-F238E27FC236}">
+                <a16:creationId xmlns:a16="http://schemas.microsoft.com/office/drawing/2014/main" id="{6B478E99-4A65-A097-A8A7-7C5D5583CDCB}"/>
+              </a:ext>
+            </a:extLst>
+          </p:cNvPr>
+          <p:cNvSpPr>
+            <a:spLocks noGrp="1"/>
+          </p:cNvSpPr>
+          <p:nvPr>
+            <p:ph sz="half" idx="1"/>
+          </p:nvPr>
+        </p:nvSpPr>
+        <p:spPr/>
+        <p:txBody>
+          <a:bodyPr/>
+          <a:lstStyle/>
+          <a:p>
+            <a:r>
+              <a:rPr lang="en-US" dirty="0"/>
+              <a:t>Diagnostics tables available in Log Analytics if you enabled them</a:t>
+            </a:r>
+          </a:p>
+        </p:txBody>
+      </p:sp>
+      <p:pic>
+        <p:nvPicPr>
+          <p:cNvPr id="6" name="Content Placeholder 5">
+            <a:extLst>
+              <a:ext uri="{FF2B5EF4-FFF2-40B4-BE49-F238E27FC236}">
+                <a16:creationId xmlns:a16="http://schemas.microsoft.com/office/drawing/2014/main" id="{F97FA602-85E6-3621-9580-F99D624AECB6}"/>
+              </a:ext>
+            </a:extLst>
+          </p:cNvPr>
+          <p:cNvPicPr>
+            <a:picLocks noGrp="1" noChangeAspect="1"/>
+          </p:cNvPicPr>
+          <p:nvPr>
+            <p:ph sz="half" idx="2"/>
+          </p:nvPr>
+        </p:nvPicPr>
+        <p:blipFill>
+          <a:blip r:embed="rId2"/>
+          <a:stretch>
+            <a:fillRect/>
+          </a:stretch>
+        </p:blipFill>
+        <p:spPr>
+          <a:xfrm>
+            <a:off x="5803641" y="1680488"/>
+            <a:ext cx="6304619" cy="4944247"/>
+          </a:xfrm>
+        </p:spPr>
+      </p:pic>
+      <p:pic>
+        <p:nvPicPr>
+          <p:cNvPr id="8" name="Picture 7">
+            <a:extLst>
+              <a:ext uri="{FF2B5EF4-FFF2-40B4-BE49-F238E27FC236}">
+                <a16:creationId xmlns:a16="http://schemas.microsoft.com/office/drawing/2014/main" id="{29F204B7-3884-8D6D-F811-9A50B2ED893B}"/>
+              </a:ext>
+            </a:extLst>
+          </p:cNvPr>
+          <p:cNvPicPr>
+            <a:picLocks noChangeAspect="1"/>
+          </p:cNvPicPr>
+          <p:nvPr/>
+        </p:nvPicPr>
+        <p:blipFill>
+          <a:blip r:embed="rId3"/>
+          <a:stretch>
+            <a:fillRect/>
+          </a:stretch>
+        </p:blipFill>
+        <p:spPr>
+          <a:xfrm>
+            <a:off x="1670540" y="3711798"/>
+            <a:ext cx="2892130" cy="2912937"/>
+          </a:xfrm>
+          <a:prstGeom prst="rect">
+            <a:avLst/>
+          </a:prstGeom>
+        </p:spPr>
+      </p:pic>
     </p:spTree>
     <p:extLst>
       <p:ext uri="{BB962C8B-B14F-4D97-AF65-F5344CB8AC3E}">
-        <p14:creationId xmlns:p14="http://schemas.microsoft.com/office/powerpoint/2010/main" val="2164601416"/>
+        <p14:creationId xmlns:p14="http://schemas.microsoft.com/office/powerpoint/2010/main" val="2940239081"/>
       </p:ext>
     </p:extLst>
   </p:cSld>
@@ -6412,6 +6511,527 @@
           <p:cNvPr id="4" name="Title 3">
             <a:extLst>
               <a:ext uri="{FF2B5EF4-FFF2-40B4-BE49-F238E27FC236}">
+                <a16:creationId xmlns:a16="http://schemas.microsoft.com/office/drawing/2014/main" id="{1DE06A61-1415-1FA6-6839-387C48430486}"/>
+              </a:ext>
+            </a:extLst>
+          </p:cNvPr>
+          <p:cNvSpPr>
+            <a:spLocks noGrp="1"/>
+          </p:cNvSpPr>
+          <p:nvPr>
+            <p:ph type="title"/>
+          </p:nvPr>
+        </p:nvSpPr>
+        <p:spPr/>
+        <p:txBody>
+          <a:bodyPr/>
+          <a:lstStyle/>
+          <a:p>
+            <a:r>
+              <a:rPr lang="en-US" dirty="0"/>
+              <a:t>Running a Log Analytics Query</a:t>
+            </a:r>
+          </a:p>
+        </p:txBody>
+      </p:sp>
+      <p:sp>
+        <p:nvSpPr>
+          <p:cNvPr id="2" name="Content Placeholder 1">
+            <a:extLst>
+              <a:ext uri="{FF2B5EF4-FFF2-40B4-BE49-F238E27FC236}">
+                <a16:creationId xmlns:a16="http://schemas.microsoft.com/office/drawing/2014/main" id="{6B478E99-4A65-A097-A8A7-7C5D5583CDCB}"/>
+              </a:ext>
+            </a:extLst>
+          </p:cNvPr>
+          <p:cNvSpPr>
+            <a:spLocks noGrp="1"/>
+          </p:cNvSpPr>
+          <p:nvPr>
+            <p:ph sz="half" idx="1"/>
+          </p:nvPr>
+        </p:nvSpPr>
+        <p:spPr>
+          <a:xfrm>
+            <a:off x="838200" y="1825625"/>
+            <a:ext cx="4592216" cy="4351338"/>
+          </a:xfrm>
+        </p:spPr>
+        <p:txBody>
+          <a:bodyPr/>
+          <a:lstStyle/>
+          <a:p>
+            <a:r>
+              <a:rPr lang="en-US" dirty="0"/>
+              <a:t>Spark pools contain limited information, primarily in the applications ended table</a:t>
+            </a:r>
+          </a:p>
+        </p:txBody>
+      </p:sp>
+      <p:pic>
+        <p:nvPicPr>
+          <p:cNvPr id="6" name="Content Placeholder 5">
+            <a:extLst>
+              <a:ext uri="{FF2B5EF4-FFF2-40B4-BE49-F238E27FC236}">
+                <a16:creationId xmlns:a16="http://schemas.microsoft.com/office/drawing/2014/main" id="{DA9F64FE-C97F-3ACD-42C6-A6D38E6277FE}"/>
+              </a:ext>
+            </a:extLst>
+          </p:cNvPr>
+          <p:cNvPicPr>
+            <a:picLocks noGrp="1" noChangeAspect="1"/>
+          </p:cNvPicPr>
+          <p:nvPr>
+            <p:ph sz="half" idx="2"/>
+          </p:nvPr>
+        </p:nvPicPr>
+        <p:blipFill>
+          <a:blip r:embed="rId2"/>
+          <a:stretch>
+            <a:fillRect/>
+          </a:stretch>
+        </p:blipFill>
+        <p:spPr>
+          <a:xfrm>
+            <a:off x="5495731" y="1469589"/>
+            <a:ext cx="6628842" cy="5136484"/>
+          </a:xfrm>
+        </p:spPr>
+      </p:pic>
+    </p:spTree>
+    <p:extLst>
+      <p:ext uri="{BB962C8B-B14F-4D97-AF65-F5344CB8AC3E}">
+        <p14:creationId xmlns:p14="http://schemas.microsoft.com/office/powerpoint/2010/main" val="2470276990"/>
+      </p:ext>
+    </p:extLst>
+  </p:cSld>
+  <p:clrMapOvr>
+    <a:masterClrMapping/>
+  </p:clrMapOvr>
+</p:sld>
+</file>
+
+<file path=ppt/slides/slide31.xml><?xml version="1.0" encoding="utf-8"?>
+<p:sld xmlns:a="http://schemas.openxmlformats.org/drawingml/2006/main" xmlns:r="http://schemas.openxmlformats.org/officeDocument/2006/relationships" xmlns:p="http://schemas.openxmlformats.org/presentationml/2006/main">
+  <p:cSld>
+    <p:spTree>
+      <p:nvGrpSpPr>
+        <p:cNvPr id="1" name=""/>
+        <p:cNvGrpSpPr/>
+        <p:nvPr/>
+      </p:nvGrpSpPr>
+      <p:grpSpPr>
+        <a:xfrm>
+          <a:off x="0" y="0"/>
+          <a:ext cx="0" cy="0"/>
+          <a:chOff x="0" y="0"/>
+          <a:chExt cx="0" cy="0"/>
+        </a:xfrm>
+      </p:grpSpPr>
+      <p:sp>
+        <p:nvSpPr>
+          <p:cNvPr id="4" name="Title 3">
+            <a:extLst>
+              <a:ext uri="{FF2B5EF4-FFF2-40B4-BE49-F238E27FC236}">
+                <a16:creationId xmlns:a16="http://schemas.microsoft.com/office/drawing/2014/main" id="{1DE06A61-1415-1FA6-6839-387C48430486}"/>
+              </a:ext>
+            </a:extLst>
+          </p:cNvPr>
+          <p:cNvSpPr>
+            <a:spLocks noGrp="1"/>
+          </p:cNvSpPr>
+          <p:nvPr>
+            <p:ph type="title"/>
+          </p:nvPr>
+        </p:nvSpPr>
+        <p:spPr/>
+        <p:txBody>
+          <a:bodyPr/>
+          <a:lstStyle/>
+          <a:p>
+            <a:r>
+              <a:rPr lang="en-US" dirty="0"/>
+              <a:t>Log Analytics Alerting</a:t>
+            </a:r>
+          </a:p>
+        </p:txBody>
+      </p:sp>
+      <p:pic>
+        <p:nvPicPr>
+          <p:cNvPr id="9" name="Content Placeholder 8">
+            <a:extLst>
+              <a:ext uri="{FF2B5EF4-FFF2-40B4-BE49-F238E27FC236}">
+                <a16:creationId xmlns:a16="http://schemas.microsoft.com/office/drawing/2014/main" id="{A833396C-41A0-7A99-C10B-BF7616F706B2}"/>
+              </a:ext>
+            </a:extLst>
+          </p:cNvPr>
+          <p:cNvPicPr>
+            <a:picLocks noGrp="1" noChangeAspect="1"/>
+          </p:cNvPicPr>
+          <p:nvPr>
+            <p:ph sz="half" idx="2"/>
+          </p:nvPr>
+        </p:nvPicPr>
+        <p:blipFill>
+          <a:blip r:embed="rId2"/>
+          <a:stretch>
+            <a:fillRect/>
+          </a:stretch>
+        </p:blipFill>
+        <p:spPr>
+          <a:xfrm>
+            <a:off x="6177275" y="1825625"/>
+            <a:ext cx="5970892" cy="5024002"/>
+          </a:xfrm>
+        </p:spPr>
+      </p:pic>
+      <p:pic>
+        <p:nvPicPr>
+          <p:cNvPr id="7" name="Content Placeholder 5">
+            <a:extLst>
+              <a:ext uri="{FF2B5EF4-FFF2-40B4-BE49-F238E27FC236}">
+                <a16:creationId xmlns:a16="http://schemas.microsoft.com/office/drawing/2014/main" id="{810D412E-89DC-AD6F-DD9F-F1A1D10B4C08}"/>
+              </a:ext>
+            </a:extLst>
+          </p:cNvPr>
+          <p:cNvPicPr>
+            <a:picLocks noGrp="1" noChangeAspect="1"/>
+          </p:cNvPicPr>
+          <p:nvPr>
+            <p:ph sz="half" idx="1"/>
+          </p:nvPr>
+        </p:nvPicPr>
+        <p:blipFill>
+          <a:blip r:embed="rId3"/>
+          <a:stretch>
+            <a:fillRect/>
+          </a:stretch>
+        </p:blipFill>
+        <p:spPr>
+          <a:xfrm>
+            <a:off x="43833" y="3526972"/>
+            <a:ext cx="5975967" cy="837340"/>
+          </a:xfrm>
+        </p:spPr>
+      </p:pic>
+    </p:spTree>
+    <p:extLst>
+      <p:ext uri="{BB962C8B-B14F-4D97-AF65-F5344CB8AC3E}">
+        <p14:creationId xmlns:p14="http://schemas.microsoft.com/office/powerpoint/2010/main" val="3974667328"/>
+      </p:ext>
+    </p:extLst>
+  </p:cSld>
+  <p:clrMapOvr>
+    <a:masterClrMapping/>
+  </p:clrMapOvr>
+</p:sld>
+</file>
+
+<file path=ppt/slides/slide32.xml><?xml version="1.0" encoding="utf-8"?>
+<p:sld xmlns:a="http://schemas.openxmlformats.org/drawingml/2006/main" xmlns:r="http://schemas.openxmlformats.org/officeDocument/2006/relationships" xmlns:p="http://schemas.openxmlformats.org/presentationml/2006/main">
+  <p:cSld>
+    <p:spTree>
+      <p:nvGrpSpPr>
+        <p:cNvPr id="1" name=""/>
+        <p:cNvGrpSpPr/>
+        <p:nvPr/>
+      </p:nvGrpSpPr>
+      <p:grpSpPr>
+        <a:xfrm>
+          <a:off x="0" y="0"/>
+          <a:ext cx="0" cy="0"/>
+          <a:chOff x="0" y="0"/>
+          <a:chExt cx="0" cy="0"/>
+        </a:xfrm>
+      </p:grpSpPr>
+      <p:sp>
+        <p:nvSpPr>
+          <p:cNvPr id="4" name="Title 3">
+            <a:extLst>
+              <a:ext uri="{FF2B5EF4-FFF2-40B4-BE49-F238E27FC236}">
+                <a16:creationId xmlns:a16="http://schemas.microsoft.com/office/drawing/2014/main" id="{1DE06A61-1415-1FA6-6839-387C48430486}"/>
+              </a:ext>
+            </a:extLst>
+          </p:cNvPr>
+          <p:cNvSpPr>
+            <a:spLocks noGrp="1"/>
+          </p:cNvSpPr>
+          <p:nvPr>
+            <p:ph type="title"/>
+          </p:nvPr>
+        </p:nvSpPr>
+        <p:spPr/>
+        <p:txBody>
+          <a:bodyPr/>
+          <a:lstStyle/>
+          <a:p>
+            <a:r>
+              <a:rPr lang="en-US" dirty="0"/>
+              <a:t>Log Analytics Alerting</a:t>
+            </a:r>
+          </a:p>
+        </p:txBody>
+      </p:sp>
+      <p:pic>
+        <p:nvPicPr>
+          <p:cNvPr id="10" name="Content Placeholder 9">
+            <a:extLst>
+              <a:ext uri="{FF2B5EF4-FFF2-40B4-BE49-F238E27FC236}">
+                <a16:creationId xmlns:a16="http://schemas.microsoft.com/office/drawing/2014/main" id="{38DDFAD1-8F8B-D37A-2485-57F3EAFD274B}"/>
+              </a:ext>
+            </a:extLst>
+          </p:cNvPr>
+          <p:cNvPicPr>
+            <a:picLocks noGrp="1" noChangeAspect="1"/>
+          </p:cNvPicPr>
+          <p:nvPr>
+            <p:ph sz="half" idx="1"/>
+          </p:nvPr>
+        </p:nvPicPr>
+        <p:blipFill>
+          <a:blip r:embed="rId2"/>
+          <a:stretch>
+            <a:fillRect/>
+          </a:stretch>
+        </p:blipFill>
+        <p:spPr>
+          <a:xfrm>
+            <a:off x="8521" y="2146041"/>
+            <a:ext cx="6011279" cy="3260491"/>
+          </a:xfrm>
+        </p:spPr>
+      </p:pic>
+      <p:pic>
+        <p:nvPicPr>
+          <p:cNvPr id="20" name="Content Placeholder 19">
+            <a:extLst>
+              <a:ext uri="{FF2B5EF4-FFF2-40B4-BE49-F238E27FC236}">
+                <a16:creationId xmlns:a16="http://schemas.microsoft.com/office/drawing/2014/main" id="{B165E032-63CF-0D46-1832-0F6D2C350CA7}"/>
+              </a:ext>
+            </a:extLst>
+          </p:cNvPr>
+          <p:cNvPicPr>
+            <a:picLocks noGrp="1" noChangeAspect="1"/>
+          </p:cNvPicPr>
+          <p:nvPr>
+            <p:ph sz="half" idx="2"/>
+          </p:nvPr>
+        </p:nvPicPr>
+        <p:blipFill>
+          <a:blip r:embed="rId3"/>
+          <a:stretch>
+            <a:fillRect/>
+          </a:stretch>
+        </p:blipFill>
+        <p:spPr>
+          <a:xfrm>
+            <a:off x="6297906" y="1614256"/>
+            <a:ext cx="5894094" cy="5202074"/>
+          </a:xfrm>
+        </p:spPr>
+      </p:pic>
+    </p:spTree>
+    <p:extLst>
+      <p:ext uri="{BB962C8B-B14F-4D97-AF65-F5344CB8AC3E}">
+        <p14:creationId xmlns:p14="http://schemas.microsoft.com/office/powerpoint/2010/main" val="1360614888"/>
+      </p:ext>
+    </p:extLst>
+  </p:cSld>
+  <p:clrMapOvr>
+    <a:masterClrMapping/>
+  </p:clrMapOvr>
+</p:sld>
+</file>
+
+<file path=ppt/slides/slide33.xml><?xml version="1.0" encoding="utf-8"?>
+<p:sld xmlns:a="http://schemas.openxmlformats.org/drawingml/2006/main" xmlns:r="http://schemas.openxmlformats.org/officeDocument/2006/relationships" xmlns:p="http://schemas.openxmlformats.org/presentationml/2006/main">
+  <p:cSld>
+    <p:spTree>
+      <p:nvGrpSpPr>
+        <p:cNvPr id="1" name=""/>
+        <p:cNvGrpSpPr/>
+        <p:nvPr/>
+      </p:nvGrpSpPr>
+      <p:grpSpPr>
+        <a:xfrm>
+          <a:off x="0" y="0"/>
+          <a:ext cx="0" cy="0"/>
+          <a:chOff x="0" y="0"/>
+          <a:chExt cx="0" cy="0"/>
+        </a:xfrm>
+      </p:grpSpPr>
+      <p:sp>
+        <p:nvSpPr>
+          <p:cNvPr id="4" name="Title 3">
+            <a:extLst>
+              <a:ext uri="{FF2B5EF4-FFF2-40B4-BE49-F238E27FC236}">
+                <a16:creationId xmlns:a16="http://schemas.microsoft.com/office/drawing/2014/main" id="{1DE06A61-1415-1FA6-6839-387C48430486}"/>
+              </a:ext>
+            </a:extLst>
+          </p:cNvPr>
+          <p:cNvSpPr>
+            <a:spLocks noGrp="1"/>
+          </p:cNvSpPr>
+          <p:nvPr>
+            <p:ph type="title"/>
+          </p:nvPr>
+        </p:nvSpPr>
+        <p:spPr/>
+        <p:txBody>
+          <a:bodyPr/>
+          <a:lstStyle/>
+          <a:p>
+            <a:r>
+              <a:rPr lang="en-US" dirty="0"/>
+              <a:t>Log Analytics Tips and Tricks</a:t>
+            </a:r>
+          </a:p>
+        </p:txBody>
+      </p:sp>
+      <p:sp>
+        <p:nvSpPr>
+          <p:cNvPr id="2" name="Content Placeholder 1">
+            <a:extLst>
+              <a:ext uri="{FF2B5EF4-FFF2-40B4-BE49-F238E27FC236}">
+                <a16:creationId xmlns:a16="http://schemas.microsoft.com/office/drawing/2014/main" id="{6B478E99-4A65-A097-A8A7-7C5D5583CDCB}"/>
+              </a:ext>
+            </a:extLst>
+          </p:cNvPr>
+          <p:cNvSpPr>
+            <a:spLocks noGrp="1"/>
+          </p:cNvSpPr>
+          <p:nvPr>
+            <p:ph idx="1"/>
+          </p:nvPr>
+        </p:nvSpPr>
+        <p:spPr/>
+        <p:txBody>
+          <a:bodyPr/>
+          <a:lstStyle/>
+          <a:p>
+            <a:r>
+              <a:rPr lang="en-US" dirty="0"/>
+              <a:t>TODO</a:t>
+            </a:r>
+          </a:p>
+        </p:txBody>
+      </p:sp>
+    </p:spTree>
+    <p:extLst>
+      <p:ext uri="{BB962C8B-B14F-4D97-AF65-F5344CB8AC3E}">
+        <p14:creationId xmlns:p14="http://schemas.microsoft.com/office/powerpoint/2010/main" val="1635524339"/>
+      </p:ext>
+    </p:extLst>
+  </p:cSld>
+  <p:clrMapOvr>
+    <a:masterClrMapping/>
+  </p:clrMapOvr>
+</p:sld>
+</file>
+
+<file path=ppt/slides/slide34.xml><?xml version="1.0" encoding="utf-8"?>
+<p:sld xmlns:a="http://schemas.openxmlformats.org/drawingml/2006/main" xmlns:r="http://schemas.openxmlformats.org/officeDocument/2006/relationships" xmlns:p="http://schemas.openxmlformats.org/presentationml/2006/main">
+  <p:cSld>
+    <p:spTree>
+      <p:nvGrpSpPr>
+        <p:cNvPr id="1" name=""/>
+        <p:cNvGrpSpPr/>
+        <p:nvPr/>
+      </p:nvGrpSpPr>
+      <p:grpSpPr>
+        <a:xfrm>
+          <a:off x="0" y="0"/>
+          <a:ext cx="0" cy="0"/>
+          <a:chOff x="0" y="0"/>
+          <a:chExt cx="0" cy="0"/>
+        </a:xfrm>
+      </p:grpSpPr>
+      <p:sp>
+        <p:nvSpPr>
+          <p:cNvPr id="4" name="Title 3">
+            <a:extLst>
+              <a:ext uri="{FF2B5EF4-FFF2-40B4-BE49-F238E27FC236}">
+                <a16:creationId xmlns:a16="http://schemas.microsoft.com/office/drawing/2014/main" id="{F212848B-D1EF-74B2-9ED1-1EC88AEFA32B}"/>
+              </a:ext>
+            </a:extLst>
+          </p:cNvPr>
+          <p:cNvSpPr>
+            <a:spLocks noGrp="1"/>
+          </p:cNvSpPr>
+          <p:nvPr>
+            <p:ph type="title"/>
+          </p:nvPr>
+        </p:nvSpPr>
+        <p:spPr/>
+        <p:txBody>
+          <a:bodyPr/>
+          <a:lstStyle/>
+          <a:p>
+            <a:r>
+              <a:rPr lang="en-US" dirty="0"/>
+              <a:t>Monitoring</a:t>
+            </a:r>
+          </a:p>
+        </p:txBody>
+      </p:sp>
+      <p:sp>
+        <p:nvSpPr>
+          <p:cNvPr id="5" name="Text Placeholder 4">
+            <a:extLst>
+              <a:ext uri="{FF2B5EF4-FFF2-40B4-BE49-F238E27FC236}">
+                <a16:creationId xmlns:a16="http://schemas.microsoft.com/office/drawing/2014/main" id="{E2A70AB1-F0D0-47F9-C4D9-39A37A431FEF}"/>
+              </a:ext>
+            </a:extLst>
+          </p:cNvPr>
+          <p:cNvSpPr>
+            <a:spLocks noGrp="1"/>
+          </p:cNvSpPr>
+          <p:nvPr>
+            <p:ph type="body" idx="1"/>
+          </p:nvPr>
+        </p:nvSpPr>
+        <p:spPr/>
+        <p:txBody>
+          <a:bodyPr/>
+          <a:lstStyle/>
+          <a:p>
+            <a:endParaRPr lang="en-US"/>
+          </a:p>
+        </p:txBody>
+      </p:sp>
+    </p:spTree>
+    <p:extLst>
+      <p:ext uri="{BB962C8B-B14F-4D97-AF65-F5344CB8AC3E}">
+        <p14:creationId xmlns:p14="http://schemas.microsoft.com/office/powerpoint/2010/main" val="2164601416"/>
+      </p:ext>
+    </p:extLst>
+  </p:cSld>
+  <p:clrMapOvr>
+    <a:masterClrMapping/>
+  </p:clrMapOvr>
+</p:sld>
+</file>
+
+<file path=ppt/slides/slide35.xml><?xml version="1.0" encoding="utf-8"?>
+<p:sld xmlns:a="http://schemas.openxmlformats.org/drawingml/2006/main" xmlns:r="http://schemas.openxmlformats.org/officeDocument/2006/relationships" xmlns:p="http://schemas.openxmlformats.org/presentationml/2006/main">
+  <p:cSld>
+    <p:spTree>
+      <p:nvGrpSpPr>
+        <p:cNvPr id="1" name=""/>
+        <p:cNvGrpSpPr/>
+        <p:nvPr/>
+      </p:nvGrpSpPr>
+      <p:grpSpPr>
+        <a:xfrm>
+          <a:off x="0" y="0"/>
+          <a:ext cx="0" cy="0"/>
+          <a:chOff x="0" y="0"/>
+          <a:chExt cx="0" cy="0"/>
+        </a:xfrm>
+      </p:grpSpPr>
+      <p:sp>
+        <p:nvSpPr>
+          <p:cNvPr id="4" name="Title 3">
+            <a:extLst>
+              <a:ext uri="{FF2B5EF4-FFF2-40B4-BE49-F238E27FC236}">
                 <a16:creationId xmlns:a16="http://schemas.microsoft.com/office/drawing/2014/main" id="{4FFAFA81-AEE9-0D3D-0A1D-4CFC3FECDF10}"/>
               </a:ext>
             </a:extLst>
@@ -6511,7 +7131,7 @@
 </p:sld>
 </file>
 
-<file path=ppt/slides/slide31.xml><?xml version="1.0" encoding="utf-8"?>
+<file path=ppt/slides/slide36.xml><?xml version="1.0" encoding="utf-8"?>
 <p:sld xmlns:a="http://schemas.openxmlformats.org/drawingml/2006/main" xmlns:r="http://schemas.openxmlformats.org/officeDocument/2006/relationships" xmlns:p="http://schemas.openxmlformats.org/presentationml/2006/main">
   <p:cSld>
     <p:spTree>
@@ -6641,7 +7261,7 @@
 </p:sld>
 </file>
 
-<file path=ppt/slides/slide32.xml><?xml version="1.0" encoding="utf-8"?>
+<file path=ppt/slides/slide37.xml><?xml version="1.0" encoding="utf-8"?>
 <p:sld xmlns:a="http://schemas.openxmlformats.org/drawingml/2006/main" xmlns:r="http://schemas.openxmlformats.org/officeDocument/2006/relationships" xmlns:p="http://schemas.openxmlformats.org/presentationml/2006/main">
   <p:cSld>
     <p:spTree>
@@ -6728,7 +7348,7 @@
 </p:sld>
 </file>
 
-<file path=ppt/slides/slide33.xml><?xml version="1.0" encoding="utf-8"?>
+<file path=ppt/slides/slide38.xml><?xml version="1.0" encoding="utf-8"?>
 <p:sld xmlns:a="http://schemas.openxmlformats.org/drawingml/2006/main" xmlns:r="http://schemas.openxmlformats.org/officeDocument/2006/relationships" xmlns:p="http://schemas.openxmlformats.org/presentationml/2006/main">
   <p:cSld>
     <p:spTree>
@@ -6864,7 +7484,7 @@
 </p:sld>
 </file>
 
-<file path=ppt/slides/slide34.xml><?xml version="1.0" encoding="utf-8"?>
+<file path=ppt/slides/slide39.xml><?xml version="1.0" encoding="utf-8"?>
 <p:sld xmlns:a="http://schemas.openxmlformats.org/drawingml/2006/main" xmlns:r="http://schemas.openxmlformats.org/officeDocument/2006/relationships" xmlns:p="http://schemas.openxmlformats.org/presentationml/2006/main">
   <p:cSld>
     <p:spTree>
@@ -6994,7 +7614,134 @@
 </p:sld>
 </file>
 
-<file path=ppt/slides/slide35.xml><?xml version="1.0" encoding="utf-8"?>
+<file path=ppt/slides/slide4.xml><?xml version="1.0" encoding="utf-8"?>
+<p:sld xmlns:a="http://schemas.openxmlformats.org/drawingml/2006/main" xmlns:r="http://schemas.openxmlformats.org/officeDocument/2006/relationships" xmlns:p="http://schemas.openxmlformats.org/presentationml/2006/main">
+  <p:cSld>
+    <p:spTree>
+      <p:nvGrpSpPr>
+        <p:cNvPr id="1" name=""/>
+        <p:cNvGrpSpPr/>
+        <p:nvPr/>
+      </p:nvGrpSpPr>
+      <p:grpSpPr>
+        <a:xfrm>
+          <a:off x="0" y="0"/>
+          <a:ext cx="0" cy="0"/>
+          <a:chOff x="0" y="0"/>
+          <a:chExt cx="0" cy="0"/>
+        </a:xfrm>
+      </p:grpSpPr>
+      <p:sp>
+        <p:nvSpPr>
+          <p:cNvPr id="7" name="Title 6">
+            <a:extLst>
+              <a:ext uri="{FF2B5EF4-FFF2-40B4-BE49-F238E27FC236}">
+                <a16:creationId xmlns:a16="http://schemas.microsoft.com/office/drawing/2014/main" id="{1853091E-C076-F82E-0235-EC14A280E225}"/>
+              </a:ext>
+            </a:extLst>
+          </p:cNvPr>
+          <p:cNvSpPr>
+            <a:spLocks noGrp="1"/>
+          </p:cNvSpPr>
+          <p:nvPr>
+            <p:ph type="title"/>
+          </p:nvPr>
+        </p:nvSpPr>
+        <p:spPr/>
+        <p:txBody>
+          <a:bodyPr/>
+          <a:lstStyle/>
+          <a:p>
+            <a:r>
+              <a:rPr lang="en-US" dirty="0"/>
+              <a:t>Key Principles – Mostly Microsoft</a:t>
+            </a:r>
+          </a:p>
+        </p:txBody>
+      </p:sp>
+      <p:sp>
+        <p:nvSpPr>
+          <p:cNvPr id="8" name="Content Placeholder 7">
+            <a:extLst>
+              <a:ext uri="{FF2B5EF4-FFF2-40B4-BE49-F238E27FC236}">
+                <a16:creationId xmlns:a16="http://schemas.microsoft.com/office/drawing/2014/main" id="{4FD15921-7634-6FAA-DD8A-41AFA788824A}"/>
+              </a:ext>
+            </a:extLst>
+          </p:cNvPr>
+          <p:cNvSpPr>
+            <a:spLocks noGrp="1"/>
+          </p:cNvSpPr>
+          <p:nvPr>
+            <p:ph idx="1"/>
+          </p:nvPr>
+        </p:nvSpPr>
+        <p:spPr/>
+        <p:txBody>
+          <a:bodyPr/>
+          <a:lstStyle/>
+          <a:p>
+            <a:r>
+              <a:rPr lang="en-US" dirty="0"/>
+              <a:t>Encrypt data at rest</a:t>
+            </a:r>
+          </a:p>
+          <a:p>
+            <a:pPr lvl="1"/>
+            <a:r>
+              <a:rPr lang="en-US" dirty="0"/>
+              <a:t>Dedicated SQL pool data encrypted on disk and can use TDE</a:t>
+            </a:r>
+          </a:p>
+          <a:p>
+            <a:pPr lvl="1"/>
+            <a:r>
+              <a:rPr lang="en-US" dirty="0"/>
+              <a:t>Data lake data encrypted on disk</a:t>
+            </a:r>
+          </a:p>
+          <a:p>
+            <a:pPr lvl="1"/>
+            <a:r>
+              <a:rPr lang="en-US" dirty="0"/>
+              <a:t>Backups encrypted automatically</a:t>
+            </a:r>
+          </a:p>
+          <a:p>
+            <a:r>
+              <a:rPr lang="en-US" dirty="0"/>
+              <a:t>Encrypt data in transit</a:t>
+            </a:r>
+          </a:p>
+          <a:p>
+            <a:pPr lvl="1"/>
+            <a:r>
+              <a:rPr lang="en-US" dirty="0"/>
+              <a:t>TLS required for all communications</a:t>
+            </a:r>
+          </a:p>
+          <a:p>
+            <a:pPr lvl="1"/>
+            <a:r>
+              <a:rPr lang="en-US" dirty="0"/>
+              <a:t>Options available to prevent routing over the public internet</a:t>
+            </a:r>
+          </a:p>
+        </p:txBody>
+      </p:sp>
+    </p:spTree>
+    <p:extLst>
+      <p:ext uri="{BB962C8B-B14F-4D97-AF65-F5344CB8AC3E}">
+        <p14:creationId xmlns:p14="http://schemas.microsoft.com/office/powerpoint/2010/main" val="3479150117"/>
+      </p:ext>
+    </p:extLst>
+  </p:cSld>
+  <p:clrMapOvr>
+    <a:masterClrMapping/>
+  </p:clrMapOvr>
+</p:sld>
+</file>
+
+<file path=ppt/slides/slide40.xml><?xml version="1.0" encoding="utf-8"?>
 <p:sld xmlns:a="http://schemas.openxmlformats.org/drawingml/2006/main" xmlns:r="http://schemas.openxmlformats.org/officeDocument/2006/relationships" xmlns:p="http://schemas.openxmlformats.org/presentationml/2006/main">
   <p:cSld>
     <p:spTree>
@@ -7101,7 +7848,7 @@
 </p:sld>
 </file>
 
-<file path=ppt/slides/slide36.xml><?xml version="1.0" encoding="utf-8"?>
+<file path=ppt/slides/slide41.xml><?xml version="1.0" encoding="utf-8"?>
 <p:sld xmlns:a="http://schemas.openxmlformats.org/drawingml/2006/main" xmlns:r="http://schemas.openxmlformats.org/officeDocument/2006/relationships" xmlns:p="http://schemas.openxmlformats.org/presentationml/2006/main">
   <p:cSld>
     <p:spTree>
@@ -7208,7 +7955,7 @@
 </p:sld>
 </file>
 
-<file path=ppt/slides/slide4.xml><?xml version="1.0" encoding="utf-8"?>
+<file path=ppt/slides/slide42.xml><?xml version="1.0" encoding="utf-8"?>
 <p:sld xmlns:a="http://schemas.openxmlformats.org/drawingml/2006/main" xmlns:r="http://schemas.openxmlformats.org/officeDocument/2006/relationships" xmlns:p="http://schemas.openxmlformats.org/presentationml/2006/main">
   <p:cSld>
     <p:spTree>
@@ -7227,10 +7974,10 @@
       </p:grpSpPr>
       <p:sp>
         <p:nvSpPr>
-          <p:cNvPr id="7" name="Title 6">
-            <a:extLst>
-              <a:ext uri="{FF2B5EF4-FFF2-40B4-BE49-F238E27FC236}">
-                <a16:creationId xmlns:a16="http://schemas.microsoft.com/office/drawing/2014/main" id="{1853091E-C076-F82E-0235-EC14A280E225}"/>
+          <p:cNvPr id="2" name="Title 1">
+            <a:extLst>
+              <a:ext uri="{FF2B5EF4-FFF2-40B4-BE49-F238E27FC236}">
+                <a16:creationId xmlns:a16="http://schemas.microsoft.com/office/drawing/2014/main" id="{BBAEED1B-6C43-F1D0-91CB-E3ABF6779593}"/>
               </a:ext>
             </a:extLst>
           </p:cNvPr>
@@ -7248,84 +7995,112 @@
           <a:p>
             <a:r>
               <a:rPr lang="en-US" dirty="0"/>
-              <a:t>Key Principles – Mostly Microsoft</a:t>
-            </a:r>
-          </a:p>
-        </p:txBody>
-      </p:sp>
-      <p:sp>
-        <p:nvSpPr>
-          <p:cNvPr id="8" name="Content Placeholder 7">
-            <a:extLst>
-              <a:ext uri="{FF2B5EF4-FFF2-40B4-BE49-F238E27FC236}">
-                <a16:creationId xmlns:a16="http://schemas.microsoft.com/office/drawing/2014/main" id="{4FD15921-7634-6FAA-DD8A-41AFA788824A}"/>
-              </a:ext>
-            </a:extLst>
-          </p:cNvPr>
-          <p:cNvSpPr>
-            <a:spLocks noGrp="1"/>
-          </p:cNvSpPr>
-          <p:nvPr>
-            <p:ph idx="1"/>
-          </p:nvPr>
-        </p:nvSpPr>
-        <p:spPr/>
-        <p:txBody>
-          <a:bodyPr/>
-          <a:lstStyle/>
-          <a:p>
-            <a:r>
-              <a:rPr lang="en-US" dirty="0"/>
-              <a:t>Encrypt data at rest</a:t>
-            </a:r>
-          </a:p>
-          <a:p>
-            <a:pPr lvl="1"/>
-            <a:r>
-              <a:rPr lang="en-US" dirty="0"/>
-              <a:t>Dedicated SQL pool data encrypted on disk and can use TDE</a:t>
-            </a:r>
-          </a:p>
-          <a:p>
-            <a:pPr lvl="1"/>
-            <a:r>
-              <a:rPr lang="en-US" dirty="0"/>
-              <a:t>Data lake data encrypted on disk</a:t>
-            </a:r>
-          </a:p>
-          <a:p>
-            <a:pPr lvl="1"/>
-            <a:r>
-              <a:rPr lang="en-US" dirty="0"/>
-              <a:t>Backups encrypted automatically</a:t>
-            </a:r>
-          </a:p>
-          <a:p>
-            <a:r>
-              <a:rPr lang="en-US" dirty="0"/>
-              <a:t>Encrypt data in transit</a:t>
-            </a:r>
-          </a:p>
-          <a:p>
-            <a:pPr lvl="1"/>
-            <a:r>
-              <a:rPr lang="en-US" dirty="0"/>
-              <a:t>TLS required for all communications</a:t>
-            </a:r>
-          </a:p>
-          <a:p>
-            <a:pPr lvl="1"/>
-            <a:r>
-              <a:rPr lang="en-US" dirty="0"/>
-              <a:t>Options available to prevent routing over the public internet</a:t>
-            </a:r>
-          </a:p>
-        </p:txBody>
-      </p:sp>
+              <a:t>Monitor Workbooks</a:t>
+            </a:r>
+          </a:p>
+        </p:txBody>
+      </p:sp>
+      <p:sp>
+        <p:nvSpPr>
+          <p:cNvPr id="3" name="Content Placeholder 2">
+            <a:extLst>
+              <a:ext uri="{FF2B5EF4-FFF2-40B4-BE49-F238E27FC236}">
+                <a16:creationId xmlns:a16="http://schemas.microsoft.com/office/drawing/2014/main" id="{FB835724-6829-DBDA-8FF4-D4DC8347A038}"/>
+              </a:ext>
+            </a:extLst>
+          </p:cNvPr>
+          <p:cNvSpPr>
+            <a:spLocks noGrp="1"/>
+          </p:cNvSpPr>
+          <p:nvPr>
+            <p:ph sz="half" idx="1"/>
+          </p:nvPr>
+        </p:nvSpPr>
+        <p:spPr/>
+        <p:txBody>
+          <a:bodyPr/>
+          <a:lstStyle/>
+          <a:p>
+            <a:r>
+              <a:rPr lang="en-US" dirty="0"/>
+              <a:t>Part of the </a:t>
+            </a:r>
+            <a:r>
+              <a:rPr lang="en-US" dirty="0">
+                <a:hlinkClick r:id="rId2"/>
+              </a:rPr>
+              <a:t>Azure Synapse Toolbox</a:t>
+            </a:r>
+            <a:endParaRPr lang="en-US" dirty="0"/>
+          </a:p>
+          <a:p>
+            <a:r>
+              <a:rPr lang="en-US" dirty="0"/>
+              <a:t>Requires data in Log Analytics</a:t>
+            </a:r>
+          </a:p>
+          <a:p>
+            <a:r>
+              <a:rPr lang="en-US" dirty="0"/>
+              <a:t>Includes components for dedicated &amp; serverless SQL pools and Synapse Pipelines</a:t>
+            </a:r>
+          </a:p>
+          <a:p>
+            <a:endParaRPr lang="en-US" dirty="0"/>
+          </a:p>
+        </p:txBody>
+      </p:sp>
+      <p:pic>
+        <p:nvPicPr>
+          <p:cNvPr id="6146" name="Picture 2" descr="DedicatedPoolWB1">
+            <a:extLst>
+              <a:ext uri="{FF2B5EF4-FFF2-40B4-BE49-F238E27FC236}">
+                <a16:creationId xmlns:a16="http://schemas.microsoft.com/office/drawing/2014/main" id="{BEE6B337-6C5A-9981-1071-04A61DDB2067}"/>
+              </a:ext>
+            </a:extLst>
+          </p:cNvPr>
+          <p:cNvPicPr>
+            <a:picLocks noGrp="1" noChangeAspect="1" noChangeArrowheads="1"/>
+          </p:cNvPicPr>
+          <p:nvPr>
+            <p:ph sz="half" idx="2"/>
+          </p:nvPr>
+        </p:nvPicPr>
+        <p:blipFill rotWithShape="1">
+          <a:blip r:embed="rId3">
+            <a:extLst>
+              <a:ext uri="{28A0092B-C50C-407E-A947-70E740481C1C}">
+                <a14:useLocalDpi xmlns:a14="http://schemas.microsoft.com/office/drawing/2010/main" val="0"/>
+              </a:ext>
+            </a:extLst>
+          </a:blip>
+          <a:srcRect b="61302"/>
+          <a:stretch/>
+        </p:blipFill>
+        <p:spPr bwMode="auto">
+          <a:xfrm>
+            <a:off x="6010160" y="1440632"/>
+            <a:ext cx="6181840" cy="5140978"/>
+          </a:xfrm>
+          <a:prstGeom prst="rect">
+            <a:avLst/>
+          </a:prstGeom>
+          <a:noFill/>
+          <a:extLst>
+            <a:ext uri="{909E8E84-426E-40DD-AFC4-6F175D3DCCD1}">
+              <a14:hiddenFill xmlns:a14="http://schemas.microsoft.com/office/drawing/2010/main">
+                <a:solidFill>
+                  <a:srgbClr val="FFFFFF"/>
+                </a:solidFill>
+              </a14:hiddenFill>
+            </a:ext>
+          </a:extLst>
+        </p:spPr>
+      </p:pic>
     </p:spTree>
     <p:extLst>
       <p:ext uri="{BB962C8B-B14F-4D97-AF65-F5344CB8AC3E}">
-        <p14:creationId xmlns:p14="http://schemas.microsoft.com/office/powerpoint/2010/main" val="3479150117"/>
+        <p14:creationId xmlns:p14="http://schemas.microsoft.com/office/powerpoint/2010/main" val="4180048554"/>
       </p:ext>
     </p:extLst>
   </p:cSld>

</xml_diff>